<commit_message>
updating data processing code & figure 4
</commit_message>
<xml_diff>
--- a/figures/figure_04.pptx
+++ b/figures/figure_04.pptx
@@ -2,12 +2,12 @@
 <file path=ppt/presentation.xml><?xml version="1.0" encoding="utf-8"?>
 <p:presentation xmlns:a="http://schemas.openxmlformats.org/drawingml/2006/main" xmlns:r="http://schemas.openxmlformats.org/officeDocument/2006/relationships" xmlns:p="http://schemas.openxmlformats.org/presentationml/2006/main" saveSubsetFonts="1">
   <p:sldMasterIdLst>
-    <p:sldMasterId id="2147483660" r:id="rId1"/>
+    <p:sldMasterId id="2147483672" r:id="rId1"/>
   </p:sldMasterIdLst>
   <p:sldIdLst>
     <p:sldId id="256" r:id="rId2"/>
   </p:sldIdLst>
-  <p:sldSz cx="6035675" cy="4572000"/>
+  <p:sldSz cx="6565900" cy="4572000"/>
   <p:notesSz cx="6858000" cy="9144000"/>
   <p:defaultTextStyle>
     <a:defPPr>
@@ -104,6 +104,11 @@
       </a:defRPr>
     </a:lvl9pPr>
   </p:defaultTextStyle>
+  <p:extLst>
+    <p:ext uri="{EFAFB233-063F-42B5-8137-9DF3F51BA10A}">
+      <p15:sldGuideLst xmlns:p15="http://schemas.microsoft.com/office/powerpoint/2012/main"/>
+    </p:ext>
+  </p:extLst>
 </p:presentation>
 </file>
 
@@ -136,15 +141,15 @@
         </p:nvSpPr>
         <p:spPr>
           <a:xfrm>
-            <a:off x="452676" y="748242"/>
-            <a:ext cx="5130324" cy="1591733"/>
+            <a:off x="492443" y="748242"/>
+            <a:ext cx="5581015" cy="1591733"/>
           </a:xfrm>
         </p:spPr>
         <p:txBody>
           <a:bodyPr anchor="b"/>
           <a:lstStyle>
             <a:lvl1pPr algn="ctr">
-              <a:defRPr sz="3961"/>
+              <a:defRPr sz="4000"/>
             </a:lvl1pPr>
           </a:lstStyle>
           <a:p>
@@ -168,8 +173,8 @@
         </p:nvSpPr>
         <p:spPr>
           <a:xfrm>
-            <a:off x="754460" y="2401359"/>
-            <a:ext cx="4526756" cy="1103841"/>
+            <a:off x="820738" y="2401359"/>
+            <a:ext cx="4924425" cy="1103841"/>
           </a:xfrm>
         </p:spPr>
         <p:txBody>
@@ -177,39 +182,39 @@
           <a:lstStyle>
             <a:lvl1pPr marL="0" indent="0" algn="ctr">
               <a:buNone/>
-              <a:defRPr sz="1584"/>
+              <a:defRPr sz="1600"/>
             </a:lvl1pPr>
-            <a:lvl2pPr marL="301798" indent="0" algn="ctr">
-              <a:buNone/>
-              <a:defRPr sz="1320"/>
+            <a:lvl2pPr marL="304815" indent="0" algn="ctr">
+              <a:buNone/>
+              <a:defRPr sz="1333"/>
             </a:lvl2pPr>
-            <a:lvl3pPr marL="603595" indent="0" algn="ctr">
-              <a:buNone/>
-              <a:defRPr sz="1188"/>
+            <a:lvl3pPr marL="609630" indent="0" algn="ctr">
+              <a:buNone/>
+              <a:defRPr sz="1200"/>
             </a:lvl3pPr>
-            <a:lvl4pPr marL="905393" indent="0" algn="ctr">
-              <a:buNone/>
-              <a:defRPr sz="1056"/>
+            <a:lvl4pPr marL="914446" indent="0" algn="ctr">
+              <a:buNone/>
+              <a:defRPr sz="1067"/>
             </a:lvl4pPr>
-            <a:lvl5pPr marL="1207191" indent="0" algn="ctr">
-              <a:buNone/>
-              <a:defRPr sz="1056"/>
+            <a:lvl5pPr marL="1219261" indent="0" algn="ctr">
+              <a:buNone/>
+              <a:defRPr sz="1067"/>
             </a:lvl5pPr>
-            <a:lvl6pPr marL="1508989" indent="0" algn="ctr">
-              <a:buNone/>
-              <a:defRPr sz="1056"/>
+            <a:lvl6pPr marL="1524076" indent="0" algn="ctr">
+              <a:buNone/>
+              <a:defRPr sz="1067"/>
             </a:lvl6pPr>
-            <a:lvl7pPr marL="1810786" indent="0" algn="ctr">
-              <a:buNone/>
-              <a:defRPr sz="1056"/>
+            <a:lvl7pPr marL="1828891" indent="0" algn="ctr">
+              <a:buNone/>
+              <a:defRPr sz="1067"/>
             </a:lvl7pPr>
-            <a:lvl8pPr marL="2112584" indent="0" algn="ctr">
-              <a:buNone/>
-              <a:defRPr sz="1056"/>
+            <a:lvl8pPr marL="2133707" indent="0" algn="ctr">
+              <a:buNone/>
+              <a:defRPr sz="1067"/>
             </a:lvl8pPr>
-            <a:lvl9pPr marL="2414382" indent="0" algn="ctr">
-              <a:buNone/>
-              <a:defRPr sz="1056"/>
+            <a:lvl9pPr marL="2438522" indent="0" algn="ctr">
+              <a:buNone/>
+              <a:defRPr sz="1067"/>
             </a:lvl9pPr>
           </a:lstStyle>
           <a:p>
@@ -238,7 +243,7 @@
           <a:p>
             <a:fld id="{CFB92ED4-9051-465E-992D-136E67DD8360}" type="datetimeFigureOut">
               <a:rPr lang="en-US" smtClean="0"/>
-              <a:t>4/24/2023</a:t>
+              <a:t>8/31/2023</a:t>
             </a:fld>
             <a:endParaRPr lang="en-US"/>
           </a:p>
@@ -289,7 +294,7 @@
     </p:spTree>
     <p:extLst>
       <p:ext uri="{BB962C8B-B14F-4D97-AF65-F5344CB8AC3E}">
-        <p14:creationId xmlns:p14="http://schemas.microsoft.com/office/powerpoint/2010/main" val="3518836291"/>
+        <p14:creationId xmlns:p14="http://schemas.microsoft.com/office/powerpoint/2010/main" val="3987394136"/>
       </p:ext>
     </p:extLst>
   </p:cSld>
@@ -408,7 +413,7 @@
           <a:p>
             <a:fld id="{CFB92ED4-9051-465E-992D-136E67DD8360}" type="datetimeFigureOut">
               <a:rPr lang="en-US" smtClean="0"/>
-              <a:t>4/24/2023</a:t>
+              <a:t>8/31/2023</a:t>
             </a:fld>
             <a:endParaRPr lang="en-US"/>
           </a:p>
@@ -459,7 +464,7 @@
     </p:spTree>
     <p:extLst>
       <p:ext uri="{BB962C8B-B14F-4D97-AF65-F5344CB8AC3E}">
-        <p14:creationId xmlns:p14="http://schemas.microsoft.com/office/powerpoint/2010/main" val="422253016"/>
+        <p14:creationId xmlns:p14="http://schemas.microsoft.com/office/powerpoint/2010/main" val="934774591"/>
       </p:ext>
     </p:extLst>
   </p:cSld>
@@ -498,8 +503,8 @@
         </p:nvSpPr>
         <p:spPr>
           <a:xfrm>
-            <a:off x="4319280" y="243417"/>
-            <a:ext cx="1301442" cy="3874559"/>
+            <a:off x="4698723" y="243417"/>
+            <a:ext cx="1415772" cy="3874559"/>
           </a:xfrm>
         </p:spPr>
         <p:txBody>
@@ -526,8 +531,8 @@
         </p:nvSpPr>
         <p:spPr>
           <a:xfrm>
-            <a:off x="414953" y="243417"/>
-            <a:ext cx="3828881" cy="3874559"/>
+            <a:off x="451406" y="243417"/>
+            <a:ext cx="4165243" cy="3874559"/>
           </a:xfrm>
         </p:spPr>
         <p:txBody>
@@ -588,7 +593,7 @@
           <a:p>
             <a:fld id="{CFB92ED4-9051-465E-992D-136E67DD8360}" type="datetimeFigureOut">
               <a:rPr lang="en-US" smtClean="0"/>
-              <a:t>4/24/2023</a:t>
+              <a:t>8/31/2023</a:t>
             </a:fld>
             <a:endParaRPr lang="en-US"/>
           </a:p>
@@ -639,7 +644,7 @@
     </p:spTree>
     <p:extLst>
       <p:ext uri="{BB962C8B-B14F-4D97-AF65-F5344CB8AC3E}">
-        <p14:creationId xmlns:p14="http://schemas.microsoft.com/office/powerpoint/2010/main" val="133794714"/>
+        <p14:creationId xmlns:p14="http://schemas.microsoft.com/office/powerpoint/2010/main" val="2153518246"/>
       </p:ext>
     </p:extLst>
   </p:cSld>
@@ -758,7 +763,7 @@
           <a:p>
             <a:fld id="{CFB92ED4-9051-465E-992D-136E67DD8360}" type="datetimeFigureOut">
               <a:rPr lang="en-US" smtClean="0"/>
-              <a:t>4/24/2023</a:t>
+              <a:t>8/31/2023</a:t>
             </a:fld>
             <a:endParaRPr lang="en-US"/>
           </a:p>
@@ -809,7 +814,7 @@
     </p:spTree>
     <p:extLst>
       <p:ext uri="{BB962C8B-B14F-4D97-AF65-F5344CB8AC3E}">
-        <p14:creationId xmlns:p14="http://schemas.microsoft.com/office/powerpoint/2010/main" val="661996375"/>
+        <p14:creationId xmlns:p14="http://schemas.microsoft.com/office/powerpoint/2010/main" val="4253705385"/>
       </p:ext>
     </p:extLst>
   </p:cSld>
@@ -848,15 +853,15 @@
         </p:nvSpPr>
         <p:spPr>
           <a:xfrm>
-            <a:off x="411809" y="1139826"/>
-            <a:ext cx="5205770" cy="1901825"/>
+            <a:off x="447986" y="1139826"/>
+            <a:ext cx="5663089" cy="1901825"/>
           </a:xfrm>
         </p:spPr>
         <p:txBody>
           <a:bodyPr anchor="b"/>
           <a:lstStyle>
             <a:lvl1pPr>
-              <a:defRPr sz="3961"/>
+              <a:defRPr sz="4000"/>
             </a:lvl1pPr>
           </a:lstStyle>
           <a:p>
@@ -880,8 +885,8 @@
         </p:nvSpPr>
         <p:spPr>
           <a:xfrm>
-            <a:off x="411809" y="3059643"/>
-            <a:ext cx="5205770" cy="1000125"/>
+            <a:off x="447986" y="3059643"/>
+            <a:ext cx="5663089" cy="1000125"/>
           </a:xfrm>
         </p:spPr>
         <p:txBody>
@@ -889,15 +894,15 @@
           <a:lstStyle>
             <a:lvl1pPr marL="0" indent="0">
               <a:buNone/>
-              <a:defRPr sz="1584">
+              <a:defRPr sz="1600">
                 <a:solidFill>
                   <a:schemeClr val="tx1"/>
                 </a:solidFill>
               </a:defRPr>
             </a:lvl1pPr>
-            <a:lvl2pPr marL="301798" indent="0">
-              <a:buNone/>
-              <a:defRPr sz="1320">
+            <a:lvl2pPr marL="304815" indent="0">
+              <a:buNone/>
+              <a:defRPr sz="1333">
                 <a:solidFill>
                   <a:schemeClr val="tx1">
                     <a:tint val="75000"/>
@@ -905,9 +910,9 @@
                 </a:solidFill>
               </a:defRPr>
             </a:lvl2pPr>
-            <a:lvl3pPr marL="603595" indent="0">
-              <a:buNone/>
-              <a:defRPr sz="1188">
+            <a:lvl3pPr marL="609630" indent="0">
+              <a:buNone/>
+              <a:defRPr sz="1200">
                 <a:solidFill>
                   <a:schemeClr val="tx1">
                     <a:tint val="75000"/>
@@ -915,9 +920,9 @@
                 </a:solidFill>
               </a:defRPr>
             </a:lvl3pPr>
-            <a:lvl4pPr marL="905393" indent="0">
-              <a:buNone/>
-              <a:defRPr sz="1056">
+            <a:lvl4pPr marL="914446" indent="0">
+              <a:buNone/>
+              <a:defRPr sz="1067">
                 <a:solidFill>
                   <a:schemeClr val="tx1">
                     <a:tint val="75000"/>
@@ -925,9 +930,9 @@
                 </a:solidFill>
               </a:defRPr>
             </a:lvl4pPr>
-            <a:lvl5pPr marL="1207191" indent="0">
-              <a:buNone/>
-              <a:defRPr sz="1056">
+            <a:lvl5pPr marL="1219261" indent="0">
+              <a:buNone/>
+              <a:defRPr sz="1067">
                 <a:solidFill>
                   <a:schemeClr val="tx1">
                     <a:tint val="75000"/>
@@ -935,9 +940,9 @@
                 </a:solidFill>
               </a:defRPr>
             </a:lvl5pPr>
-            <a:lvl6pPr marL="1508989" indent="0">
-              <a:buNone/>
-              <a:defRPr sz="1056">
+            <a:lvl6pPr marL="1524076" indent="0">
+              <a:buNone/>
+              <a:defRPr sz="1067">
                 <a:solidFill>
                   <a:schemeClr val="tx1">
                     <a:tint val="75000"/>
@@ -945,9 +950,9 @@
                 </a:solidFill>
               </a:defRPr>
             </a:lvl6pPr>
-            <a:lvl7pPr marL="1810786" indent="0">
-              <a:buNone/>
-              <a:defRPr sz="1056">
+            <a:lvl7pPr marL="1828891" indent="0">
+              <a:buNone/>
+              <a:defRPr sz="1067">
                 <a:solidFill>
                   <a:schemeClr val="tx1">
                     <a:tint val="75000"/>
@@ -955,9 +960,9 @@
                 </a:solidFill>
               </a:defRPr>
             </a:lvl7pPr>
-            <a:lvl8pPr marL="2112584" indent="0">
-              <a:buNone/>
-              <a:defRPr sz="1056">
+            <a:lvl8pPr marL="2133707" indent="0">
+              <a:buNone/>
+              <a:defRPr sz="1067">
                 <a:solidFill>
                   <a:schemeClr val="tx1">
                     <a:tint val="75000"/>
@@ -965,9 +970,9 @@
                 </a:solidFill>
               </a:defRPr>
             </a:lvl8pPr>
-            <a:lvl9pPr marL="2414382" indent="0">
-              <a:buNone/>
-              <a:defRPr sz="1056">
+            <a:lvl9pPr marL="2438522" indent="0">
+              <a:buNone/>
+              <a:defRPr sz="1067">
                 <a:solidFill>
                   <a:schemeClr val="tx1">
                     <a:tint val="75000"/>
@@ -1002,7 +1007,7 @@
           <a:p>
             <a:fld id="{CFB92ED4-9051-465E-992D-136E67DD8360}" type="datetimeFigureOut">
               <a:rPr lang="en-US" smtClean="0"/>
-              <a:t>4/24/2023</a:t>
+              <a:t>8/31/2023</a:t>
             </a:fld>
             <a:endParaRPr lang="en-US"/>
           </a:p>
@@ -1053,7 +1058,7 @@
     </p:spTree>
     <p:extLst>
       <p:ext uri="{BB962C8B-B14F-4D97-AF65-F5344CB8AC3E}">
-        <p14:creationId xmlns:p14="http://schemas.microsoft.com/office/powerpoint/2010/main" val="1584093540"/>
+        <p14:creationId xmlns:p14="http://schemas.microsoft.com/office/powerpoint/2010/main" val="455353220"/>
       </p:ext>
     </p:extLst>
   </p:cSld>
@@ -1115,8 +1120,8 @@
         </p:nvSpPr>
         <p:spPr>
           <a:xfrm>
-            <a:off x="414953" y="1217083"/>
-            <a:ext cx="2565162" cy="2900892"/>
+            <a:off x="451405" y="1217083"/>
+            <a:ext cx="2790508" cy="2900892"/>
           </a:xfrm>
         </p:spPr>
         <p:txBody>
@@ -1172,8 +1177,8 @@
         </p:nvSpPr>
         <p:spPr>
           <a:xfrm>
-            <a:off x="3055560" y="1217083"/>
-            <a:ext cx="2565162" cy="2900892"/>
+            <a:off x="3323987" y="1217083"/>
+            <a:ext cx="2790508" cy="2900892"/>
           </a:xfrm>
         </p:spPr>
         <p:txBody>
@@ -1234,7 +1239,7 @@
           <a:p>
             <a:fld id="{CFB92ED4-9051-465E-992D-136E67DD8360}" type="datetimeFigureOut">
               <a:rPr lang="en-US" smtClean="0"/>
-              <a:t>4/24/2023</a:t>
+              <a:t>8/31/2023</a:t>
             </a:fld>
             <a:endParaRPr lang="en-US"/>
           </a:p>
@@ -1285,7 +1290,7 @@
     </p:spTree>
     <p:extLst>
       <p:ext uri="{BB962C8B-B14F-4D97-AF65-F5344CB8AC3E}">
-        <p14:creationId xmlns:p14="http://schemas.microsoft.com/office/powerpoint/2010/main" val="809404854"/>
+        <p14:creationId xmlns:p14="http://schemas.microsoft.com/office/powerpoint/2010/main" val="2880281528"/>
       </p:ext>
     </p:extLst>
   </p:cSld>
@@ -1324,8 +1329,8 @@
         </p:nvSpPr>
         <p:spPr>
           <a:xfrm>
-            <a:off x="415739" y="243418"/>
-            <a:ext cx="5205770" cy="883709"/>
+            <a:off x="452261" y="243418"/>
+            <a:ext cx="5663089" cy="883709"/>
           </a:xfrm>
         </p:spPr>
         <p:txBody>
@@ -1352,8 +1357,8 @@
         </p:nvSpPr>
         <p:spPr>
           <a:xfrm>
-            <a:off x="415739" y="1120775"/>
-            <a:ext cx="2553373" cy="549275"/>
+            <a:off x="452262" y="1120775"/>
+            <a:ext cx="2777683" cy="549275"/>
           </a:xfrm>
         </p:spPr>
         <p:txBody>
@@ -1361,39 +1366,39 @@
           <a:lstStyle>
             <a:lvl1pPr marL="0" indent="0">
               <a:buNone/>
-              <a:defRPr sz="1584" b="1"/>
+              <a:defRPr sz="1600" b="1"/>
             </a:lvl1pPr>
-            <a:lvl2pPr marL="301798" indent="0">
-              <a:buNone/>
-              <a:defRPr sz="1320" b="1"/>
+            <a:lvl2pPr marL="304815" indent="0">
+              <a:buNone/>
+              <a:defRPr sz="1333" b="1"/>
             </a:lvl2pPr>
-            <a:lvl3pPr marL="603595" indent="0">
-              <a:buNone/>
-              <a:defRPr sz="1188" b="1"/>
+            <a:lvl3pPr marL="609630" indent="0">
+              <a:buNone/>
+              <a:defRPr sz="1200" b="1"/>
             </a:lvl3pPr>
-            <a:lvl4pPr marL="905393" indent="0">
-              <a:buNone/>
-              <a:defRPr sz="1056" b="1"/>
+            <a:lvl4pPr marL="914446" indent="0">
+              <a:buNone/>
+              <a:defRPr sz="1067" b="1"/>
             </a:lvl4pPr>
-            <a:lvl5pPr marL="1207191" indent="0">
-              <a:buNone/>
-              <a:defRPr sz="1056" b="1"/>
+            <a:lvl5pPr marL="1219261" indent="0">
+              <a:buNone/>
+              <a:defRPr sz="1067" b="1"/>
             </a:lvl5pPr>
-            <a:lvl6pPr marL="1508989" indent="0">
-              <a:buNone/>
-              <a:defRPr sz="1056" b="1"/>
+            <a:lvl6pPr marL="1524076" indent="0">
+              <a:buNone/>
+              <a:defRPr sz="1067" b="1"/>
             </a:lvl6pPr>
-            <a:lvl7pPr marL="1810786" indent="0">
-              <a:buNone/>
-              <a:defRPr sz="1056" b="1"/>
+            <a:lvl7pPr marL="1828891" indent="0">
+              <a:buNone/>
+              <a:defRPr sz="1067" b="1"/>
             </a:lvl7pPr>
-            <a:lvl8pPr marL="2112584" indent="0">
-              <a:buNone/>
-              <a:defRPr sz="1056" b="1"/>
+            <a:lvl8pPr marL="2133707" indent="0">
+              <a:buNone/>
+              <a:defRPr sz="1067" b="1"/>
             </a:lvl8pPr>
-            <a:lvl9pPr marL="2414382" indent="0">
-              <a:buNone/>
-              <a:defRPr sz="1056" b="1"/>
+            <a:lvl9pPr marL="2438522" indent="0">
+              <a:buNone/>
+              <a:defRPr sz="1067" b="1"/>
             </a:lvl9pPr>
           </a:lstStyle>
           <a:p>
@@ -1417,8 +1422,8 @@
         </p:nvSpPr>
         <p:spPr>
           <a:xfrm>
-            <a:off x="415739" y="1670050"/>
-            <a:ext cx="2553373" cy="2456392"/>
+            <a:off x="452262" y="1670050"/>
+            <a:ext cx="2777683" cy="2456392"/>
           </a:xfrm>
         </p:spPr>
         <p:txBody>
@@ -1474,8 +1479,8 @@
         </p:nvSpPr>
         <p:spPr>
           <a:xfrm>
-            <a:off x="3055561" y="1120775"/>
-            <a:ext cx="2565948" cy="549275"/>
+            <a:off x="3323987" y="1120775"/>
+            <a:ext cx="2791363" cy="549275"/>
           </a:xfrm>
         </p:spPr>
         <p:txBody>
@@ -1483,39 +1488,39 @@
           <a:lstStyle>
             <a:lvl1pPr marL="0" indent="0">
               <a:buNone/>
-              <a:defRPr sz="1584" b="1"/>
+              <a:defRPr sz="1600" b="1"/>
             </a:lvl1pPr>
-            <a:lvl2pPr marL="301798" indent="0">
-              <a:buNone/>
-              <a:defRPr sz="1320" b="1"/>
+            <a:lvl2pPr marL="304815" indent="0">
+              <a:buNone/>
+              <a:defRPr sz="1333" b="1"/>
             </a:lvl2pPr>
-            <a:lvl3pPr marL="603595" indent="0">
-              <a:buNone/>
-              <a:defRPr sz="1188" b="1"/>
+            <a:lvl3pPr marL="609630" indent="0">
+              <a:buNone/>
+              <a:defRPr sz="1200" b="1"/>
             </a:lvl3pPr>
-            <a:lvl4pPr marL="905393" indent="0">
-              <a:buNone/>
-              <a:defRPr sz="1056" b="1"/>
+            <a:lvl4pPr marL="914446" indent="0">
+              <a:buNone/>
+              <a:defRPr sz="1067" b="1"/>
             </a:lvl4pPr>
-            <a:lvl5pPr marL="1207191" indent="0">
-              <a:buNone/>
-              <a:defRPr sz="1056" b="1"/>
+            <a:lvl5pPr marL="1219261" indent="0">
+              <a:buNone/>
+              <a:defRPr sz="1067" b="1"/>
             </a:lvl5pPr>
-            <a:lvl6pPr marL="1508989" indent="0">
-              <a:buNone/>
-              <a:defRPr sz="1056" b="1"/>
+            <a:lvl6pPr marL="1524076" indent="0">
+              <a:buNone/>
+              <a:defRPr sz="1067" b="1"/>
             </a:lvl6pPr>
-            <a:lvl7pPr marL="1810786" indent="0">
-              <a:buNone/>
-              <a:defRPr sz="1056" b="1"/>
+            <a:lvl7pPr marL="1828891" indent="0">
+              <a:buNone/>
+              <a:defRPr sz="1067" b="1"/>
             </a:lvl7pPr>
-            <a:lvl8pPr marL="2112584" indent="0">
-              <a:buNone/>
-              <a:defRPr sz="1056" b="1"/>
+            <a:lvl8pPr marL="2133707" indent="0">
+              <a:buNone/>
+              <a:defRPr sz="1067" b="1"/>
             </a:lvl8pPr>
-            <a:lvl9pPr marL="2414382" indent="0">
-              <a:buNone/>
-              <a:defRPr sz="1056" b="1"/>
+            <a:lvl9pPr marL="2438522" indent="0">
+              <a:buNone/>
+              <a:defRPr sz="1067" b="1"/>
             </a:lvl9pPr>
           </a:lstStyle>
           <a:p>
@@ -1539,8 +1544,8 @@
         </p:nvSpPr>
         <p:spPr>
           <a:xfrm>
-            <a:off x="3055561" y="1670050"/>
-            <a:ext cx="2565948" cy="2456392"/>
+            <a:off x="3323987" y="1670050"/>
+            <a:ext cx="2791363" cy="2456392"/>
           </a:xfrm>
         </p:spPr>
         <p:txBody>
@@ -1601,7 +1606,7 @@
           <a:p>
             <a:fld id="{CFB92ED4-9051-465E-992D-136E67DD8360}" type="datetimeFigureOut">
               <a:rPr lang="en-US" smtClean="0"/>
-              <a:t>4/24/2023</a:t>
+              <a:t>8/31/2023</a:t>
             </a:fld>
             <a:endParaRPr lang="en-US"/>
           </a:p>
@@ -1652,7 +1657,7 @@
     </p:spTree>
     <p:extLst>
       <p:ext uri="{BB962C8B-B14F-4D97-AF65-F5344CB8AC3E}">
-        <p14:creationId xmlns:p14="http://schemas.microsoft.com/office/powerpoint/2010/main" val="2904376861"/>
+        <p14:creationId xmlns:p14="http://schemas.microsoft.com/office/powerpoint/2010/main" val="3928428482"/>
       </p:ext>
     </p:extLst>
   </p:cSld>
@@ -1719,7 +1724,7 @@
           <a:p>
             <a:fld id="{CFB92ED4-9051-465E-992D-136E67DD8360}" type="datetimeFigureOut">
               <a:rPr lang="en-US" smtClean="0"/>
-              <a:t>4/24/2023</a:t>
+              <a:t>8/31/2023</a:t>
             </a:fld>
             <a:endParaRPr lang="en-US"/>
           </a:p>
@@ -1770,7 +1775,7 @@
     </p:spTree>
     <p:extLst>
       <p:ext uri="{BB962C8B-B14F-4D97-AF65-F5344CB8AC3E}">
-        <p14:creationId xmlns:p14="http://schemas.microsoft.com/office/powerpoint/2010/main" val="1764935898"/>
+        <p14:creationId xmlns:p14="http://schemas.microsoft.com/office/powerpoint/2010/main" val="2745158625"/>
       </p:ext>
     </p:extLst>
   </p:cSld>
@@ -1814,7 +1819,7 @@
           <a:p>
             <a:fld id="{CFB92ED4-9051-465E-992D-136E67DD8360}" type="datetimeFigureOut">
               <a:rPr lang="en-US" smtClean="0"/>
-              <a:t>4/24/2023</a:t>
+              <a:t>8/31/2023</a:t>
             </a:fld>
             <a:endParaRPr lang="en-US"/>
           </a:p>
@@ -1865,7 +1870,7 @@
     </p:spTree>
     <p:extLst>
       <p:ext uri="{BB962C8B-B14F-4D97-AF65-F5344CB8AC3E}">
-        <p14:creationId xmlns:p14="http://schemas.microsoft.com/office/powerpoint/2010/main" val="1688954469"/>
+        <p14:creationId xmlns:p14="http://schemas.microsoft.com/office/powerpoint/2010/main" val="1705710894"/>
       </p:ext>
     </p:extLst>
   </p:cSld>
@@ -1904,15 +1909,15 @@
         </p:nvSpPr>
         <p:spPr>
           <a:xfrm>
-            <a:off x="415739" y="304800"/>
-            <a:ext cx="1946662" cy="1066800"/>
+            <a:off x="452261" y="304800"/>
+            <a:ext cx="2117674" cy="1066800"/>
           </a:xfrm>
         </p:spPr>
         <p:txBody>
           <a:bodyPr anchor="b"/>
           <a:lstStyle>
             <a:lvl1pPr>
-              <a:defRPr sz="2112"/>
+              <a:defRPr sz="2133"/>
             </a:lvl1pPr>
           </a:lstStyle>
           <a:p>
@@ -1936,39 +1941,39 @@
         </p:nvSpPr>
         <p:spPr>
           <a:xfrm>
-            <a:off x="2565948" y="658285"/>
-            <a:ext cx="3055560" cy="3249083"/>
+            <a:off x="2791363" y="658285"/>
+            <a:ext cx="3323987" cy="3249083"/>
           </a:xfrm>
         </p:spPr>
         <p:txBody>
           <a:bodyPr/>
           <a:lstStyle>
             <a:lvl1pPr>
-              <a:defRPr sz="2112"/>
+              <a:defRPr sz="2133"/>
             </a:lvl1pPr>
             <a:lvl2pPr>
-              <a:defRPr sz="1848"/>
+              <a:defRPr sz="1867"/>
             </a:lvl2pPr>
             <a:lvl3pPr>
-              <a:defRPr sz="1584"/>
+              <a:defRPr sz="1600"/>
             </a:lvl3pPr>
             <a:lvl4pPr>
-              <a:defRPr sz="1320"/>
+              <a:defRPr sz="1333"/>
             </a:lvl4pPr>
             <a:lvl5pPr>
-              <a:defRPr sz="1320"/>
+              <a:defRPr sz="1333"/>
             </a:lvl5pPr>
             <a:lvl6pPr>
-              <a:defRPr sz="1320"/>
+              <a:defRPr sz="1333"/>
             </a:lvl6pPr>
             <a:lvl7pPr>
-              <a:defRPr sz="1320"/>
+              <a:defRPr sz="1333"/>
             </a:lvl7pPr>
             <a:lvl8pPr>
-              <a:defRPr sz="1320"/>
+              <a:defRPr sz="1333"/>
             </a:lvl8pPr>
             <a:lvl9pPr>
-              <a:defRPr sz="1320"/>
+              <a:defRPr sz="1333"/>
             </a:lvl9pPr>
           </a:lstStyle>
           <a:p>
@@ -2021,8 +2026,8 @@
         </p:nvSpPr>
         <p:spPr>
           <a:xfrm>
-            <a:off x="415739" y="1371600"/>
-            <a:ext cx="1946662" cy="2541059"/>
+            <a:off x="452261" y="1371600"/>
+            <a:ext cx="2117674" cy="2541059"/>
           </a:xfrm>
         </p:spPr>
         <p:txBody>
@@ -2030,39 +2035,39 @@
           <a:lstStyle>
             <a:lvl1pPr marL="0" indent="0">
               <a:buNone/>
-              <a:defRPr sz="1056"/>
+              <a:defRPr sz="1067"/>
             </a:lvl1pPr>
-            <a:lvl2pPr marL="301798" indent="0">
-              <a:buNone/>
-              <a:defRPr sz="924"/>
+            <a:lvl2pPr marL="304815" indent="0">
+              <a:buNone/>
+              <a:defRPr sz="933"/>
             </a:lvl2pPr>
-            <a:lvl3pPr marL="603595" indent="0">
-              <a:buNone/>
-              <a:defRPr sz="792"/>
+            <a:lvl3pPr marL="609630" indent="0">
+              <a:buNone/>
+              <a:defRPr sz="800"/>
             </a:lvl3pPr>
-            <a:lvl4pPr marL="905393" indent="0">
-              <a:buNone/>
-              <a:defRPr sz="660"/>
+            <a:lvl4pPr marL="914446" indent="0">
+              <a:buNone/>
+              <a:defRPr sz="667"/>
             </a:lvl4pPr>
-            <a:lvl5pPr marL="1207191" indent="0">
-              <a:buNone/>
-              <a:defRPr sz="660"/>
+            <a:lvl5pPr marL="1219261" indent="0">
+              <a:buNone/>
+              <a:defRPr sz="667"/>
             </a:lvl5pPr>
-            <a:lvl6pPr marL="1508989" indent="0">
-              <a:buNone/>
-              <a:defRPr sz="660"/>
+            <a:lvl6pPr marL="1524076" indent="0">
+              <a:buNone/>
+              <a:defRPr sz="667"/>
             </a:lvl6pPr>
-            <a:lvl7pPr marL="1810786" indent="0">
-              <a:buNone/>
-              <a:defRPr sz="660"/>
+            <a:lvl7pPr marL="1828891" indent="0">
+              <a:buNone/>
+              <a:defRPr sz="667"/>
             </a:lvl7pPr>
-            <a:lvl8pPr marL="2112584" indent="0">
-              <a:buNone/>
-              <a:defRPr sz="660"/>
+            <a:lvl8pPr marL="2133707" indent="0">
+              <a:buNone/>
+              <a:defRPr sz="667"/>
             </a:lvl8pPr>
-            <a:lvl9pPr marL="2414382" indent="0">
-              <a:buNone/>
-              <a:defRPr sz="660"/>
+            <a:lvl9pPr marL="2438522" indent="0">
+              <a:buNone/>
+              <a:defRPr sz="667"/>
             </a:lvl9pPr>
           </a:lstStyle>
           <a:p>
@@ -2091,7 +2096,7 @@
           <a:p>
             <a:fld id="{CFB92ED4-9051-465E-992D-136E67DD8360}" type="datetimeFigureOut">
               <a:rPr lang="en-US" smtClean="0"/>
-              <a:t>4/24/2023</a:t>
+              <a:t>8/31/2023</a:t>
             </a:fld>
             <a:endParaRPr lang="en-US"/>
           </a:p>
@@ -2142,7 +2147,7 @@
     </p:spTree>
     <p:extLst>
       <p:ext uri="{BB962C8B-B14F-4D97-AF65-F5344CB8AC3E}">
-        <p14:creationId xmlns:p14="http://schemas.microsoft.com/office/powerpoint/2010/main" val="97242003"/>
+        <p14:creationId xmlns:p14="http://schemas.microsoft.com/office/powerpoint/2010/main" val="3889437183"/>
       </p:ext>
     </p:extLst>
   </p:cSld>
@@ -2181,15 +2186,15 @@
         </p:nvSpPr>
         <p:spPr>
           <a:xfrm>
-            <a:off x="415739" y="304800"/>
-            <a:ext cx="1946662" cy="1066800"/>
+            <a:off x="452261" y="304800"/>
+            <a:ext cx="2117674" cy="1066800"/>
           </a:xfrm>
         </p:spPr>
         <p:txBody>
           <a:bodyPr anchor="b"/>
           <a:lstStyle>
             <a:lvl1pPr>
-              <a:defRPr sz="2112"/>
+              <a:defRPr sz="2133"/>
             </a:lvl1pPr>
           </a:lstStyle>
           <a:p>
@@ -2213,8 +2218,8 @@
         </p:nvSpPr>
         <p:spPr>
           <a:xfrm>
-            <a:off x="2565948" y="658285"/>
-            <a:ext cx="3055560" cy="3249083"/>
+            <a:off x="2791363" y="658285"/>
+            <a:ext cx="3323987" cy="3249083"/>
           </a:xfrm>
         </p:spPr>
         <p:txBody>
@@ -2222,39 +2227,39 @@
           <a:lstStyle>
             <a:lvl1pPr marL="0" indent="0">
               <a:buNone/>
-              <a:defRPr sz="2112"/>
+              <a:defRPr sz="2133"/>
             </a:lvl1pPr>
-            <a:lvl2pPr marL="301798" indent="0">
-              <a:buNone/>
-              <a:defRPr sz="1848"/>
+            <a:lvl2pPr marL="304815" indent="0">
+              <a:buNone/>
+              <a:defRPr sz="1867"/>
             </a:lvl2pPr>
-            <a:lvl3pPr marL="603595" indent="0">
-              <a:buNone/>
-              <a:defRPr sz="1584"/>
+            <a:lvl3pPr marL="609630" indent="0">
+              <a:buNone/>
+              <a:defRPr sz="1600"/>
             </a:lvl3pPr>
-            <a:lvl4pPr marL="905393" indent="0">
-              <a:buNone/>
-              <a:defRPr sz="1320"/>
+            <a:lvl4pPr marL="914446" indent="0">
+              <a:buNone/>
+              <a:defRPr sz="1333"/>
             </a:lvl4pPr>
-            <a:lvl5pPr marL="1207191" indent="0">
-              <a:buNone/>
-              <a:defRPr sz="1320"/>
+            <a:lvl5pPr marL="1219261" indent="0">
+              <a:buNone/>
+              <a:defRPr sz="1333"/>
             </a:lvl5pPr>
-            <a:lvl6pPr marL="1508989" indent="0">
-              <a:buNone/>
-              <a:defRPr sz="1320"/>
+            <a:lvl6pPr marL="1524076" indent="0">
+              <a:buNone/>
+              <a:defRPr sz="1333"/>
             </a:lvl6pPr>
-            <a:lvl7pPr marL="1810786" indent="0">
-              <a:buNone/>
-              <a:defRPr sz="1320"/>
+            <a:lvl7pPr marL="1828891" indent="0">
+              <a:buNone/>
+              <a:defRPr sz="1333"/>
             </a:lvl7pPr>
-            <a:lvl8pPr marL="2112584" indent="0">
-              <a:buNone/>
-              <a:defRPr sz="1320"/>
+            <a:lvl8pPr marL="2133707" indent="0">
+              <a:buNone/>
+              <a:defRPr sz="1333"/>
             </a:lvl8pPr>
-            <a:lvl9pPr marL="2414382" indent="0">
-              <a:buNone/>
-              <a:defRPr sz="1320"/>
+            <a:lvl9pPr marL="2438522" indent="0">
+              <a:buNone/>
+              <a:defRPr sz="1333"/>
             </a:lvl9pPr>
           </a:lstStyle>
           <a:p>
@@ -2278,8 +2283,8 @@
         </p:nvSpPr>
         <p:spPr>
           <a:xfrm>
-            <a:off x="415739" y="1371600"/>
-            <a:ext cx="1946662" cy="2541059"/>
+            <a:off x="452261" y="1371600"/>
+            <a:ext cx="2117674" cy="2541059"/>
           </a:xfrm>
         </p:spPr>
         <p:txBody>
@@ -2287,39 +2292,39 @@
           <a:lstStyle>
             <a:lvl1pPr marL="0" indent="0">
               <a:buNone/>
-              <a:defRPr sz="1056"/>
+              <a:defRPr sz="1067"/>
             </a:lvl1pPr>
-            <a:lvl2pPr marL="301798" indent="0">
-              <a:buNone/>
-              <a:defRPr sz="924"/>
+            <a:lvl2pPr marL="304815" indent="0">
+              <a:buNone/>
+              <a:defRPr sz="933"/>
             </a:lvl2pPr>
-            <a:lvl3pPr marL="603595" indent="0">
-              <a:buNone/>
-              <a:defRPr sz="792"/>
+            <a:lvl3pPr marL="609630" indent="0">
+              <a:buNone/>
+              <a:defRPr sz="800"/>
             </a:lvl3pPr>
-            <a:lvl4pPr marL="905393" indent="0">
-              <a:buNone/>
-              <a:defRPr sz="660"/>
+            <a:lvl4pPr marL="914446" indent="0">
+              <a:buNone/>
+              <a:defRPr sz="667"/>
             </a:lvl4pPr>
-            <a:lvl5pPr marL="1207191" indent="0">
-              <a:buNone/>
-              <a:defRPr sz="660"/>
+            <a:lvl5pPr marL="1219261" indent="0">
+              <a:buNone/>
+              <a:defRPr sz="667"/>
             </a:lvl5pPr>
-            <a:lvl6pPr marL="1508989" indent="0">
-              <a:buNone/>
-              <a:defRPr sz="660"/>
+            <a:lvl6pPr marL="1524076" indent="0">
+              <a:buNone/>
+              <a:defRPr sz="667"/>
             </a:lvl6pPr>
-            <a:lvl7pPr marL="1810786" indent="0">
-              <a:buNone/>
-              <a:defRPr sz="660"/>
+            <a:lvl7pPr marL="1828891" indent="0">
+              <a:buNone/>
+              <a:defRPr sz="667"/>
             </a:lvl7pPr>
-            <a:lvl8pPr marL="2112584" indent="0">
-              <a:buNone/>
-              <a:defRPr sz="660"/>
+            <a:lvl8pPr marL="2133707" indent="0">
+              <a:buNone/>
+              <a:defRPr sz="667"/>
             </a:lvl8pPr>
-            <a:lvl9pPr marL="2414382" indent="0">
-              <a:buNone/>
-              <a:defRPr sz="660"/>
+            <a:lvl9pPr marL="2438522" indent="0">
+              <a:buNone/>
+              <a:defRPr sz="667"/>
             </a:lvl9pPr>
           </a:lstStyle>
           <a:p>
@@ -2348,7 +2353,7 @@
           <a:p>
             <a:fld id="{CFB92ED4-9051-465E-992D-136E67DD8360}" type="datetimeFigureOut">
               <a:rPr lang="en-US" smtClean="0"/>
-              <a:t>4/24/2023</a:t>
+              <a:t>8/31/2023</a:t>
             </a:fld>
             <a:endParaRPr lang="en-US"/>
           </a:p>
@@ -2399,7 +2404,7 @@
     </p:spTree>
     <p:extLst>
       <p:ext uri="{BB962C8B-B14F-4D97-AF65-F5344CB8AC3E}">
-        <p14:creationId xmlns:p14="http://schemas.microsoft.com/office/powerpoint/2010/main" val="2446727569"/>
+        <p14:creationId xmlns:p14="http://schemas.microsoft.com/office/powerpoint/2010/main" val="3544442545"/>
       </p:ext>
     </p:extLst>
   </p:cSld>
@@ -2443,8 +2448,8 @@
         </p:nvSpPr>
         <p:spPr>
           <a:xfrm>
-            <a:off x="414953" y="243418"/>
-            <a:ext cx="5205770" cy="883709"/>
+            <a:off x="451406" y="243418"/>
+            <a:ext cx="5663089" cy="883709"/>
           </a:xfrm>
           <a:prstGeom prst="rect">
             <a:avLst/>
@@ -2476,8 +2481,8 @@
         </p:nvSpPr>
         <p:spPr>
           <a:xfrm>
-            <a:off x="414953" y="1217083"/>
-            <a:ext cx="5205770" cy="2900892"/>
+            <a:off x="451406" y="1217083"/>
+            <a:ext cx="5663089" cy="2900892"/>
           </a:xfrm>
           <a:prstGeom prst="rect">
             <a:avLst/>
@@ -2538,8 +2543,8 @@
         </p:nvSpPr>
         <p:spPr>
           <a:xfrm>
-            <a:off x="414953" y="4237568"/>
-            <a:ext cx="1358027" cy="243417"/>
+            <a:off x="451405" y="4237568"/>
+            <a:ext cx="1477328" cy="243417"/>
           </a:xfrm>
           <a:prstGeom prst="rect">
             <a:avLst/>
@@ -2549,7 +2554,7 @@
           <a:bodyPr vert="horz" lIns="91440" tIns="45720" rIns="91440" bIns="45720" rtlCol="0" anchor="ctr"/>
           <a:lstStyle>
             <a:lvl1pPr algn="l">
-              <a:defRPr sz="792">
+              <a:defRPr sz="800">
                 <a:solidFill>
                   <a:schemeClr val="tx1">
                     <a:tint val="75000"/>
@@ -2561,7 +2566,7 @@
           <a:p>
             <a:fld id="{CFB92ED4-9051-465E-992D-136E67DD8360}" type="datetimeFigureOut">
               <a:rPr lang="en-US" smtClean="0"/>
-              <a:t>4/24/2023</a:t>
+              <a:t>8/31/2023</a:t>
             </a:fld>
             <a:endParaRPr lang="en-US"/>
           </a:p>
@@ -2579,8 +2584,8 @@
         </p:nvSpPr>
         <p:spPr>
           <a:xfrm>
-            <a:off x="1999318" y="4237568"/>
-            <a:ext cx="2037040" cy="243417"/>
+            <a:off x="2174955" y="4237568"/>
+            <a:ext cx="2215991" cy="243417"/>
           </a:xfrm>
           <a:prstGeom prst="rect">
             <a:avLst/>
@@ -2590,7 +2595,7 @@
           <a:bodyPr vert="horz" lIns="91440" tIns="45720" rIns="91440" bIns="45720" rtlCol="0" anchor="ctr"/>
           <a:lstStyle>
             <a:lvl1pPr algn="ctr">
-              <a:defRPr sz="792">
+              <a:defRPr sz="800">
                 <a:solidFill>
                   <a:schemeClr val="tx1">
                     <a:tint val="75000"/>
@@ -2616,8 +2621,8 @@
         </p:nvSpPr>
         <p:spPr>
           <a:xfrm>
-            <a:off x="4262695" y="4237568"/>
-            <a:ext cx="1358027" cy="243417"/>
+            <a:off x="4637167" y="4237568"/>
+            <a:ext cx="1477328" cy="243417"/>
           </a:xfrm>
           <a:prstGeom prst="rect">
             <a:avLst/>
@@ -2627,7 +2632,7 @@
           <a:bodyPr vert="horz" lIns="91440" tIns="45720" rIns="91440" bIns="45720" rtlCol="0" anchor="ctr"/>
           <a:lstStyle>
             <a:lvl1pPr algn="r">
-              <a:defRPr sz="792">
+              <a:defRPr sz="800">
                 <a:solidFill>
                   <a:schemeClr val="tx1">
                     <a:tint val="75000"/>
@@ -2648,27 +2653,27 @@
     </p:spTree>
     <p:extLst>
       <p:ext uri="{BB962C8B-B14F-4D97-AF65-F5344CB8AC3E}">
-        <p14:creationId xmlns:p14="http://schemas.microsoft.com/office/powerpoint/2010/main" val="2131750093"/>
+        <p14:creationId xmlns:p14="http://schemas.microsoft.com/office/powerpoint/2010/main" val="3893294518"/>
       </p:ext>
     </p:extLst>
   </p:cSld>
   <p:clrMap bg1="lt1" tx1="dk1" bg2="lt2" tx2="dk2" accent1="accent1" accent2="accent2" accent3="accent3" accent4="accent4" accent5="accent5" accent6="accent6" hlink="hlink" folHlink="folHlink"/>
   <p:sldLayoutIdLst>
-    <p:sldLayoutId id="2147483661" r:id="rId1"/>
-    <p:sldLayoutId id="2147483662" r:id="rId2"/>
-    <p:sldLayoutId id="2147483663" r:id="rId3"/>
-    <p:sldLayoutId id="2147483664" r:id="rId4"/>
-    <p:sldLayoutId id="2147483665" r:id="rId5"/>
-    <p:sldLayoutId id="2147483666" r:id="rId6"/>
-    <p:sldLayoutId id="2147483667" r:id="rId7"/>
-    <p:sldLayoutId id="2147483668" r:id="rId8"/>
-    <p:sldLayoutId id="2147483669" r:id="rId9"/>
-    <p:sldLayoutId id="2147483670" r:id="rId10"/>
-    <p:sldLayoutId id="2147483671" r:id="rId11"/>
+    <p:sldLayoutId id="2147483673" r:id="rId1"/>
+    <p:sldLayoutId id="2147483674" r:id="rId2"/>
+    <p:sldLayoutId id="2147483675" r:id="rId3"/>
+    <p:sldLayoutId id="2147483676" r:id="rId4"/>
+    <p:sldLayoutId id="2147483677" r:id="rId5"/>
+    <p:sldLayoutId id="2147483678" r:id="rId6"/>
+    <p:sldLayoutId id="2147483679" r:id="rId7"/>
+    <p:sldLayoutId id="2147483680" r:id="rId8"/>
+    <p:sldLayoutId id="2147483681" r:id="rId9"/>
+    <p:sldLayoutId id="2147483682" r:id="rId10"/>
+    <p:sldLayoutId id="2147483683" r:id="rId11"/>
   </p:sldLayoutIdLst>
   <p:txStyles>
     <p:titleStyle>
-      <a:lvl1pPr algn="l" defTabSz="603595" rtl="0" eaLnBrk="1" latinLnBrk="0" hangingPunct="1">
+      <a:lvl1pPr algn="l" defTabSz="609630" rtl="0" eaLnBrk="1" latinLnBrk="0" hangingPunct="1">
         <a:lnSpc>
           <a:spcPct val="90000"/>
         </a:lnSpc>
@@ -2676,7 +2681,7 @@
           <a:spcPct val="0"/>
         </a:spcBef>
         <a:buNone/>
-        <a:defRPr sz="2904" kern="1200">
+        <a:defRPr sz="2933" kern="1200">
           <a:solidFill>
             <a:schemeClr val="tx1"/>
           </a:solidFill>
@@ -2687,16 +2692,16 @@
       </a:lvl1pPr>
     </p:titleStyle>
     <p:bodyStyle>
-      <a:lvl1pPr marL="150899" indent="-150899" algn="l" defTabSz="603595" rtl="0" eaLnBrk="1" latinLnBrk="0" hangingPunct="1">
+      <a:lvl1pPr marL="152408" indent="-152408" algn="l" defTabSz="609630" rtl="0" eaLnBrk="1" latinLnBrk="0" hangingPunct="1">
         <a:lnSpc>
           <a:spcPct val="90000"/>
         </a:lnSpc>
         <a:spcBef>
-          <a:spcPts val="660"/>
+          <a:spcPts val="667"/>
         </a:spcBef>
         <a:buFont typeface="Arial" panose="020B0604020202020204" pitchFamily="34" charset="0"/>
         <a:buChar char="•"/>
-        <a:defRPr sz="1848" kern="1200">
+        <a:defRPr sz="1867" kern="1200">
           <a:solidFill>
             <a:schemeClr val="tx1"/>
           </a:solidFill>
@@ -2705,16 +2710,16 @@
           <a:cs typeface="+mn-cs"/>
         </a:defRPr>
       </a:lvl1pPr>
-      <a:lvl2pPr marL="452697" indent="-150899" algn="l" defTabSz="603595" rtl="0" eaLnBrk="1" latinLnBrk="0" hangingPunct="1">
+      <a:lvl2pPr marL="457223" indent="-152408" algn="l" defTabSz="609630" rtl="0" eaLnBrk="1" latinLnBrk="0" hangingPunct="1">
         <a:lnSpc>
           <a:spcPct val="90000"/>
         </a:lnSpc>
         <a:spcBef>
-          <a:spcPts val="330"/>
+          <a:spcPts val="333"/>
         </a:spcBef>
         <a:buFont typeface="Arial" panose="020B0604020202020204" pitchFamily="34" charset="0"/>
         <a:buChar char="•"/>
-        <a:defRPr sz="1584" kern="1200">
+        <a:defRPr sz="1600" kern="1200">
           <a:solidFill>
             <a:schemeClr val="tx1"/>
           </a:solidFill>
@@ -2723,16 +2728,16 @@
           <a:cs typeface="+mn-cs"/>
         </a:defRPr>
       </a:lvl2pPr>
-      <a:lvl3pPr marL="754494" indent="-150899" algn="l" defTabSz="603595" rtl="0" eaLnBrk="1" latinLnBrk="0" hangingPunct="1">
+      <a:lvl3pPr marL="762038" indent="-152408" algn="l" defTabSz="609630" rtl="0" eaLnBrk="1" latinLnBrk="0" hangingPunct="1">
         <a:lnSpc>
           <a:spcPct val="90000"/>
         </a:lnSpc>
         <a:spcBef>
-          <a:spcPts val="330"/>
+          <a:spcPts val="333"/>
         </a:spcBef>
         <a:buFont typeface="Arial" panose="020B0604020202020204" pitchFamily="34" charset="0"/>
         <a:buChar char="•"/>
-        <a:defRPr sz="1320" kern="1200">
+        <a:defRPr sz="1333" kern="1200">
           <a:solidFill>
             <a:schemeClr val="tx1"/>
           </a:solidFill>
@@ -2741,16 +2746,16 @@
           <a:cs typeface="+mn-cs"/>
         </a:defRPr>
       </a:lvl3pPr>
-      <a:lvl4pPr marL="1056292" indent="-150899" algn="l" defTabSz="603595" rtl="0" eaLnBrk="1" latinLnBrk="0" hangingPunct="1">
+      <a:lvl4pPr marL="1066853" indent="-152408" algn="l" defTabSz="609630" rtl="0" eaLnBrk="1" latinLnBrk="0" hangingPunct="1">
         <a:lnSpc>
           <a:spcPct val="90000"/>
         </a:lnSpc>
         <a:spcBef>
-          <a:spcPts val="330"/>
+          <a:spcPts val="333"/>
         </a:spcBef>
         <a:buFont typeface="Arial" panose="020B0604020202020204" pitchFamily="34" charset="0"/>
         <a:buChar char="•"/>
-        <a:defRPr sz="1188" kern="1200">
+        <a:defRPr sz="1200" kern="1200">
           <a:solidFill>
             <a:schemeClr val="tx1"/>
           </a:solidFill>
@@ -2759,16 +2764,16 @@
           <a:cs typeface="+mn-cs"/>
         </a:defRPr>
       </a:lvl4pPr>
-      <a:lvl5pPr marL="1358090" indent="-150899" algn="l" defTabSz="603595" rtl="0" eaLnBrk="1" latinLnBrk="0" hangingPunct="1">
+      <a:lvl5pPr marL="1371669" indent="-152408" algn="l" defTabSz="609630" rtl="0" eaLnBrk="1" latinLnBrk="0" hangingPunct="1">
         <a:lnSpc>
           <a:spcPct val="90000"/>
         </a:lnSpc>
         <a:spcBef>
-          <a:spcPts val="330"/>
+          <a:spcPts val="333"/>
         </a:spcBef>
         <a:buFont typeface="Arial" panose="020B0604020202020204" pitchFamily="34" charset="0"/>
         <a:buChar char="•"/>
-        <a:defRPr sz="1188" kern="1200">
+        <a:defRPr sz="1200" kern="1200">
           <a:solidFill>
             <a:schemeClr val="tx1"/>
           </a:solidFill>
@@ -2777,16 +2782,16 @@
           <a:cs typeface="+mn-cs"/>
         </a:defRPr>
       </a:lvl5pPr>
-      <a:lvl6pPr marL="1659887" indent="-150899" algn="l" defTabSz="603595" rtl="0" eaLnBrk="1" latinLnBrk="0" hangingPunct="1">
+      <a:lvl6pPr marL="1676484" indent="-152408" algn="l" defTabSz="609630" rtl="0" eaLnBrk="1" latinLnBrk="0" hangingPunct="1">
         <a:lnSpc>
           <a:spcPct val="90000"/>
         </a:lnSpc>
         <a:spcBef>
-          <a:spcPts val="330"/>
+          <a:spcPts val="333"/>
         </a:spcBef>
         <a:buFont typeface="Arial" panose="020B0604020202020204" pitchFamily="34" charset="0"/>
         <a:buChar char="•"/>
-        <a:defRPr sz="1188" kern="1200">
+        <a:defRPr sz="1200" kern="1200">
           <a:solidFill>
             <a:schemeClr val="tx1"/>
           </a:solidFill>
@@ -2795,16 +2800,16 @@
           <a:cs typeface="+mn-cs"/>
         </a:defRPr>
       </a:lvl6pPr>
-      <a:lvl7pPr marL="1961685" indent="-150899" algn="l" defTabSz="603595" rtl="0" eaLnBrk="1" latinLnBrk="0" hangingPunct="1">
+      <a:lvl7pPr marL="1981299" indent="-152408" algn="l" defTabSz="609630" rtl="0" eaLnBrk="1" latinLnBrk="0" hangingPunct="1">
         <a:lnSpc>
           <a:spcPct val="90000"/>
         </a:lnSpc>
         <a:spcBef>
-          <a:spcPts val="330"/>
+          <a:spcPts val="333"/>
         </a:spcBef>
         <a:buFont typeface="Arial" panose="020B0604020202020204" pitchFamily="34" charset="0"/>
         <a:buChar char="•"/>
-        <a:defRPr sz="1188" kern="1200">
+        <a:defRPr sz="1200" kern="1200">
           <a:solidFill>
             <a:schemeClr val="tx1"/>
           </a:solidFill>
@@ -2813,16 +2818,16 @@
           <a:cs typeface="+mn-cs"/>
         </a:defRPr>
       </a:lvl7pPr>
-      <a:lvl8pPr marL="2263483" indent="-150899" algn="l" defTabSz="603595" rtl="0" eaLnBrk="1" latinLnBrk="0" hangingPunct="1">
+      <a:lvl8pPr marL="2286114" indent="-152408" algn="l" defTabSz="609630" rtl="0" eaLnBrk="1" latinLnBrk="0" hangingPunct="1">
         <a:lnSpc>
           <a:spcPct val="90000"/>
         </a:lnSpc>
         <a:spcBef>
-          <a:spcPts val="330"/>
+          <a:spcPts val="333"/>
         </a:spcBef>
         <a:buFont typeface="Arial" panose="020B0604020202020204" pitchFamily="34" charset="0"/>
         <a:buChar char="•"/>
-        <a:defRPr sz="1188" kern="1200">
+        <a:defRPr sz="1200" kern="1200">
           <a:solidFill>
             <a:schemeClr val="tx1"/>
           </a:solidFill>
@@ -2831,16 +2836,16 @@
           <a:cs typeface="+mn-cs"/>
         </a:defRPr>
       </a:lvl8pPr>
-      <a:lvl9pPr marL="2565281" indent="-150899" algn="l" defTabSz="603595" rtl="0" eaLnBrk="1" latinLnBrk="0" hangingPunct="1">
+      <a:lvl9pPr marL="2590930" indent="-152408" algn="l" defTabSz="609630" rtl="0" eaLnBrk="1" latinLnBrk="0" hangingPunct="1">
         <a:lnSpc>
           <a:spcPct val="90000"/>
         </a:lnSpc>
         <a:spcBef>
-          <a:spcPts val="330"/>
+          <a:spcPts val="333"/>
         </a:spcBef>
         <a:buFont typeface="Arial" panose="020B0604020202020204" pitchFamily="34" charset="0"/>
         <a:buChar char="•"/>
-        <a:defRPr sz="1188" kern="1200">
+        <a:defRPr sz="1200" kern="1200">
           <a:solidFill>
             <a:schemeClr val="tx1"/>
           </a:solidFill>
@@ -2854,8 +2859,8 @@
       <a:defPPr>
         <a:defRPr lang="en-US"/>
       </a:defPPr>
-      <a:lvl1pPr marL="0" algn="l" defTabSz="603595" rtl="0" eaLnBrk="1" latinLnBrk="0" hangingPunct="1">
-        <a:defRPr sz="1188" kern="1200">
+      <a:lvl1pPr marL="0" algn="l" defTabSz="609630" rtl="0" eaLnBrk="1" latinLnBrk="0" hangingPunct="1">
+        <a:defRPr sz="1200" kern="1200">
           <a:solidFill>
             <a:schemeClr val="tx1"/>
           </a:solidFill>
@@ -2864,8 +2869,8 @@
           <a:cs typeface="+mn-cs"/>
         </a:defRPr>
       </a:lvl1pPr>
-      <a:lvl2pPr marL="301798" algn="l" defTabSz="603595" rtl="0" eaLnBrk="1" latinLnBrk="0" hangingPunct="1">
-        <a:defRPr sz="1188" kern="1200">
+      <a:lvl2pPr marL="304815" algn="l" defTabSz="609630" rtl="0" eaLnBrk="1" latinLnBrk="0" hangingPunct="1">
+        <a:defRPr sz="1200" kern="1200">
           <a:solidFill>
             <a:schemeClr val="tx1"/>
           </a:solidFill>
@@ -2874,8 +2879,8 @@
           <a:cs typeface="+mn-cs"/>
         </a:defRPr>
       </a:lvl2pPr>
-      <a:lvl3pPr marL="603595" algn="l" defTabSz="603595" rtl="0" eaLnBrk="1" latinLnBrk="0" hangingPunct="1">
-        <a:defRPr sz="1188" kern="1200">
+      <a:lvl3pPr marL="609630" algn="l" defTabSz="609630" rtl="0" eaLnBrk="1" latinLnBrk="0" hangingPunct="1">
+        <a:defRPr sz="1200" kern="1200">
           <a:solidFill>
             <a:schemeClr val="tx1"/>
           </a:solidFill>
@@ -2884,8 +2889,8 @@
           <a:cs typeface="+mn-cs"/>
         </a:defRPr>
       </a:lvl3pPr>
-      <a:lvl4pPr marL="905393" algn="l" defTabSz="603595" rtl="0" eaLnBrk="1" latinLnBrk="0" hangingPunct="1">
-        <a:defRPr sz="1188" kern="1200">
+      <a:lvl4pPr marL="914446" algn="l" defTabSz="609630" rtl="0" eaLnBrk="1" latinLnBrk="0" hangingPunct="1">
+        <a:defRPr sz="1200" kern="1200">
           <a:solidFill>
             <a:schemeClr val="tx1"/>
           </a:solidFill>
@@ -2894,8 +2899,8 @@
           <a:cs typeface="+mn-cs"/>
         </a:defRPr>
       </a:lvl4pPr>
-      <a:lvl5pPr marL="1207191" algn="l" defTabSz="603595" rtl="0" eaLnBrk="1" latinLnBrk="0" hangingPunct="1">
-        <a:defRPr sz="1188" kern="1200">
+      <a:lvl5pPr marL="1219261" algn="l" defTabSz="609630" rtl="0" eaLnBrk="1" latinLnBrk="0" hangingPunct="1">
+        <a:defRPr sz="1200" kern="1200">
           <a:solidFill>
             <a:schemeClr val="tx1"/>
           </a:solidFill>
@@ -2904,8 +2909,8 @@
           <a:cs typeface="+mn-cs"/>
         </a:defRPr>
       </a:lvl5pPr>
-      <a:lvl6pPr marL="1508989" algn="l" defTabSz="603595" rtl="0" eaLnBrk="1" latinLnBrk="0" hangingPunct="1">
-        <a:defRPr sz="1188" kern="1200">
+      <a:lvl6pPr marL="1524076" algn="l" defTabSz="609630" rtl="0" eaLnBrk="1" latinLnBrk="0" hangingPunct="1">
+        <a:defRPr sz="1200" kern="1200">
           <a:solidFill>
             <a:schemeClr val="tx1"/>
           </a:solidFill>
@@ -2914,8 +2919,8 @@
           <a:cs typeface="+mn-cs"/>
         </a:defRPr>
       </a:lvl6pPr>
-      <a:lvl7pPr marL="1810786" algn="l" defTabSz="603595" rtl="0" eaLnBrk="1" latinLnBrk="0" hangingPunct="1">
-        <a:defRPr sz="1188" kern="1200">
+      <a:lvl7pPr marL="1828891" algn="l" defTabSz="609630" rtl="0" eaLnBrk="1" latinLnBrk="0" hangingPunct="1">
+        <a:defRPr sz="1200" kern="1200">
           <a:solidFill>
             <a:schemeClr val="tx1"/>
           </a:solidFill>
@@ -2924,8 +2929,8 @@
           <a:cs typeface="+mn-cs"/>
         </a:defRPr>
       </a:lvl7pPr>
-      <a:lvl8pPr marL="2112584" algn="l" defTabSz="603595" rtl="0" eaLnBrk="1" latinLnBrk="0" hangingPunct="1">
-        <a:defRPr sz="1188" kern="1200">
+      <a:lvl8pPr marL="2133707" algn="l" defTabSz="609630" rtl="0" eaLnBrk="1" latinLnBrk="0" hangingPunct="1">
+        <a:defRPr sz="1200" kern="1200">
           <a:solidFill>
             <a:schemeClr val="tx1"/>
           </a:solidFill>
@@ -2934,8 +2939,8 @@
           <a:cs typeface="+mn-cs"/>
         </a:defRPr>
       </a:lvl8pPr>
-      <a:lvl9pPr marL="2414382" algn="l" defTabSz="603595" rtl="0" eaLnBrk="1" latinLnBrk="0" hangingPunct="1">
-        <a:defRPr sz="1188" kern="1200">
+      <a:lvl9pPr marL="2438522" algn="l" defTabSz="609630" rtl="0" eaLnBrk="1" latinLnBrk="0" hangingPunct="1">
+        <a:defRPr sz="1200" kern="1200">
           <a:solidFill>
             <a:schemeClr val="tx1"/>
           </a:solidFill>
@@ -2968,10 +2973,10 @@
       </p:grpSpPr>
       <p:grpSp>
         <p:nvGrpSpPr>
-          <p:cNvPr id="15" name="Group 14">
+          <p:cNvPr id="34" name="Group 33">
             <a:extLst>
               <a:ext uri="{FF2B5EF4-FFF2-40B4-BE49-F238E27FC236}">
-                <a16:creationId xmlns:a16="http://schemas.microsoft.com/office/drawing/2014/main" id="{F75C2653-A7B2-00E3-3992-390EB84610D3}"/>
+                <a16:creationId xmlns:a16="http://schemas.microsoft.com/office/drawing/2014/main" id="{BEA27B1D-BCFF-9ED2-AFB3-CCD2D37016DB}"/>
               </a:ext>
             </a:extLst>
           </p:cNvPr>
@@ -2980,18 +2985,18 @@
         </p:nvGrpSpPr>
         <p:grpSpPr>
           <a:xfrm>
-            <a:off x="-5462" y="0"/>
-            <a:ext cx="6041137" cy="4572000"/>
-            <a:chOff x="-5462" y="0"/>
-            <a:chExt cx="6041137" cy="4572000"/>
+            <a:off x="-5462" y="12763"/>
+            <a:ext cx="6562472" cy="4562141"/>
+            <a:chOff x="-5462" y="12763"/>
+            <a:chExt cx="6562472" cy="4562141"/>
           </a:xfrm>
         </p:grpSpPr>
         <p:pic>
           <p:nvPicPr>
-            <p:cNvPr id="5" name="Picture 4" descr="Chart, scatter chart&#10;&#10;Description automatically generated">
+            <p:cNvPr id="35" name="Picture 34" descr="A diagram of a number of people&#10;&#10;Description automatically generated with medium confidence">
               <a:extLst>
                 <a:ext uri="{FF2B5EF4-FFF2-40B4-BE49-F238E27FC236}">
-                  <a16:creationId xmlns:a16="http://schemas.microsoft.com/office/drawing/2014/main" id="{4DE9C3BB-7FDD-291F-36F7-34895F295CF1}"/>
+                  <a16:creationId xmlns:a16="http://schemas.microsoft.com/office/drawing/2014/main" id="{E61645C4-D9B8-518F-5347-F26620BCF9DF}"/>
                 </a:ext>
               </a:extLst>
             </p:cNvPr>
@@ -3008,13 +3013,13 @@
                 </a:ext>
               </a:extLst>
             </a:blip>
-            <a:srcRect r="1641"/>
+            <a:srcRect t="6853"/>
             <a:stretch/>
           </p:blipFill>
           <p:spPr>
             <a:xfrm>
-              <a:off x="189612" y="0"/>
-              <a:ext cx="5846063" cy="4572000"/>
+              <a:off x="19050" y="316230"/>
+              <a:ext cx="6537960" cy="4258674"/>
             </a:xfrm>
             <a:prstGeom prst="rect">
               <a:avLst/>
@@ -3023,10 +3028,10 @@
         </p:pic>
         <p:sp>
           <p:nvSpPr>
-            <p:cNvPr id="6" name="Rectangle 5">
+            <p:cNvPr id="36" name="Rectangle 35">
               <a:extLst>
                 <a:ext uri="{FF2B5EF4-FFF2-40B4-BE49-F238E27FC236}">
-                  <a16:creationId xmlns:a16="http://schemas.microsoft.com/office/drawing/2014/main" id="{9567BFA5-E2E3-1720-2D2D-ACEB754C35C6}"/>
+                  <a16:creationId xmlns:a16="http://schemas.microsoft.com/office/drawing/2014/main" id="{3EB6DD20-0800-CCDC-DC9D-E111A56D9F93}"/>
                 </a:ext>
               </a:extLst>
             </p:cNvPr>
@@ -3082,10 +3087,10 @@
         </p:sp>
         <p:cxnSp>
           <p:nvCxnSpPr>
-            <p:cNvPr id="8" name="Straight Arrow Connector 7">
+            <p:cNvPr id="37" name="Straight Arrow Connector 36">
               <a:extLst>
                 <a:ext uri="{FF2B5EF4-FFF2-40B4-BE49-F238E27FC236}">
-                  <a16:creationId xmlns:a16="http://schemas.microsoft.com/office/drawing/2014/main" id="{795CE835-5F25-E09D-A493-9FAE9A0ADBF1}"/>
+                  <a16:creationId xmlns:a16="http://schemas.microsoft.com/office/drawing/2014/main" id="{40578695-4612-C851-79F0-31375D17E214}"/>
                 </a:ext>
               </a:extLst>
             </p:cNvPr>
@@ -3126,10 +3131,10 @@
         </p:cxnSp>
         <p:sp>
           <p:nvSpPr>
-            <p:cNvPr id="11" name="Rectangle 10">
+            <p:cNvPr id="38" name="Rectangle 37">
               <a:extLst>
                 <a:ext uri="{FF2B5EF4-FFF2-40B4-BE49-F238E27FC236}">
-                  <a16:creationId xmlns:a16="http://schemas.microsoft.com/office/drawing/2014/main" id="{38541664-8F09-B36A-A257-316BAE807B38}"/>
+                  <a16:creationId xmlns:a16="http://schemas.microsoft.com/office/drawing/2014/main" id="{C3151F08-D322-462D-98FB-3D2DE9852FBD}"/>
                 </a:ext>
               </a:extLst>
             </p:cNvPr>
@@ -3178,10 +3183,10 @@
         </p:sp>
         <p:grpSp>
           <p:nvGrpSpPr>
-            <p:cNvPr id="14" name="Group 13">
+            <p:cNvPr id="39" name="Group 38">
               <a:extLst>
                 <a:ext uri="{FF2B5EF4-FFF2-40B4-BE49-F238E27FC236}">
-                  <a16:creationId xmlns:a16="http://schemas.microsoft.com/office/drawing/2014/main" id="{288A8B30-2FC5-B5A2-77DB-098B42B9D305}"/>
+                  <a16:creationId xmlns:a16="http://schemas.microsoft.com/office/drawing/2014/main" id="{89458D2D-42AA-AB9F-FC12-EFB3791963FF}"/>
                 </a:ext>
               </a:extLst>
             </p:cNvPr>
@@ -3191,17 +3196,17 @@
           <p:grpSpPr>
             <a:xfrm>
               <a:off x="256032" y="90487"/>
-              <a:ext cx="3329307" cy="196025"/>
+              <a:ext cx="3451227" cy="196025"/>
               <a:chOff x="256032" y="90487"/>
-              <a:chExt cx="3329307" cy="196025"/>
+              <a:chExt cx="3451227" cy="196025"/>
             </a:xfrm>
           </p:grpSpPr>
           <p:sp>
             <p:nvSpPr>
-              <p:cNvPr id="12" name="Rectangle 11">
+              <p:cNvPr id="40" name="Rectangle 39">
                 <a:extLst>
                   <a:ext uri="{FF2B5EF4-FFF2-40B4-BE49-F238E27FC236}">
-                    <a16:creationId xmlns:a16="http://schemas.microsoft.com/office/drawing/2014/main" id="{A75B2277-EEAB-EAAE-CC23-1A5D65BC0ADB}"/>
+                    <a16:creationId xmlns:a16="http://schemas.microsoft.com/office/drawing/2014/main" id="{DAC49BB1-5053-8C5E-90A5-5EADB8604BBB}"/>
                   </a:ext>
                 </a:extLst>
               </p:cNvPr>
@@ -3257,10 +3262,10 @@
           </p:sp>
           <p:sp>
             <p:nvSpPr>
-              <p:cNvPr id="13" name="Rectangle 12">
+              <p:cNvPr id="41" name="Rectangle 40">
                 <a:extLst>
                   <a:ext uri="{FF2B5EF4-FFF2-40B4-BE49-F238E27FC236}">
-                    <a16:creationId xmlns:a16="http://schemas.microsoft.com/office/drawing/2014/main" id="{20066F62-9EAB-3518-7E4F-5B9962894779}"/>
+                    <a16:creationId xmlns:a16="http://schemas.microsoft.com/office/drawing/2014/main" id="{7323413C-563E-3CDB-1803-5DB143176A90}"/>
                   </a:ext>
                 </a:extLst>
               </p:cNvPr>
@@ -3269,7 +3274,7 @@
             </p:nvSpPr>
             <p:spPr>
               <a:xfrm>
-                <a:off x="3065527" y="91440"/>
+                <a:off x="3187447" y="91440"/>
                 <a:ext cx="519812" cy="195072"/>
               </a:xfrm>
               <a:prstGeom prst="rect">

</xml_diff>